<commit_message>
Recommender Book System Project
</commit_message>
<xml_diff>
--- a/BookRecommender_prediction/Presentation_BRS.pptx
+++ b/BookRecommender_prediction/Presentation_BRS.pptx
@@ -5,7 +5,7 @@
     <p:sldMasterId id="2147484453" r:id="rId1"/>
   </p:sldMasterIdLst>
   <p:notesMasterIdLst>
-    <p:notesMasterId r:id="rId16"/>
+    <p:notesMasterId r:id="rId19"/>
   </p:notesMasterIdLst>
   <p:sldIdLst>
     <p:sldId id="256" r:id="rId2"/>
@@ -13,15 +13,18 @@
     <p:sldId id="258" r:id="rId4"/>
     <p:sldId id="272" r:id="rId5"/>
     <p:sldId id="266" r:id="rId6"/>
-    <p:sldId id="273" r:id="rId7"/>
-    <p:sldId id="276" r:id="rId8"/>
-    <p:sldId id="294" r:id="rId9"/>
-    <p:sldId id="292" r:id="rId10"/>
-    <p:sldId id="293" r:id="rId11"/>
-    <p:sldId id="286" r:id="rId12"/>
-    <p:sldId id="287" r:id="rId13"/>
-    <p:sldId id="288" r:id="rId14"/>
-    <p:sldId id="290" r:id="rId15"/>
+    <p:sldId id="298" r:id="rId7"/>
+    <p:sldId id="297" r:id="rId8"/>
+    <p:sldId id="273" r:id="rId9"/>
+    <p:sldId id="276" r:id="rId10"/>
+    <p:sldId id="294" r:id="rId11"/>
+    <p:sldId id="292" r:id="rId12"/>
+    <p:sldId id="293" r:id="rId13"/>
+    <p:sldId id="296" r:id="rId14"/>
+    <p:sldId id="286" r:id="rId15"/>
+    <p:sldId id="287" r:id="rId16"/>
+    <p:sldId id="288" r:id="rId17"/>
+    <p:sldId id="290" r:id="rId18"/>
   </p:sldIdLst>
   <p:sldSz cx="12192000" cy="6858000"/>
   <p:notesSz cx="9144000" cy="6858000"/>
@@ -130,11 +133,14 @@
             <p14:sldId id="258"/>
             <p14:sldId id="272"/>
             <p14:sldId id="266"/>
+            <p14:sldId id="298"/>
+            <p14:sldId id="297"/>
             <p14:sldId id="273"/>
             <p14:sldId id="276"/>
             <p14:sldId id="294"/>
             <p14:sldId id="292"/>
             <p14:sldId id="293"/>
+            <p14:sldId id="296"/>
             <p14:sldId id="286"/>
             <p14:sldId id="287"/>
             <p14:sldId id="288"/>
@@ -3546,7 +3552,7 @@
           <a:p>
             <a:fld id="{66907B59-4645-C54B-8DF0-15B3DFA298BB}" type="datetimeFigureOut">
               <a:rPr lang="en-US" smtClean="0"/>
-              <a:t>11/14/19</a:t>
+              <a:t>11/18/19</a:t>
             </a:fld>
             <a:endParaRPr lang="en-US"/>
           </a:p>
@@ -3962,7 +3968,7 @@
           <a:p>
             <a:fld id="{766C6F04-8709-2A46-ACB5-99ACA6D3D3E5}" type="slidenum">
               <a:rPr lang="en-US" smtClean="0"/>
-              <a:t>13</a:t>
+              <a:t>16</a:t>
             </a:fld>
             <a:endParaRPr lang="en-US"/>
           </a:p>
@@ -4046,7 +4052,7 @@
           <a:p>
             <a:fld id="{766C6F04-8709-2A46-ACB5-99ACA6D3D3E5}" type="slidenum">
               <a:rPr lang="en-US" smtClean="0"/>
-              <a:t>14</a:t>
+              <a:t>17</a:t>
             </a:fld>
             <a:endParaRPr lang="en-US"/>
           </a:p>
@@ -4470,7 +4476,7 @@
           <a:p>
             <a:fld id="{766C6F04-8709-2A46-ACB5-99ACA6D3D3E5}" type="slidenum">
               <a:rPr lang="en-US" smtClean="0"/>
-              <a:t>6</a:t>
+              <a:t>8</a:t>
             </a:fld>
             <a:endParaRPr lang="en-US"/>
           </a:p>
@@ -4558,7 +4564,7 @@
           <a:p>
             <a:fld id="{766C6F04-8709-2A46-ACB5-99ACA6D3D3E5}" type="slidenum">
               <a:rPr lang="en-US" smtClean="0"/>
-              <a:t>7</a:t>
+              <a:t>9</a:t>
             </a:fld>
             <a:endParaRPr lang="en-US"/>
           </a:p>
@@ -4642,7 +4648,7 @@
           <a:p>
             <a:fld id="{766C6F04-8709-2A46-ACB5-99ACA6D3D3E5}" type="slidenum">
               <a:rPr lang="en-US" smtClean="0"/>
-              <a:t>11</a:t>
+              <a:t>14</a:t>
             </a:fld>
             <a:endParaRPr lang="en-US"/>
           </a:p>
@@ -4726,7 +4732,7 @@
           <a:p>
             <a:fld id="{766C6F04-8709-2A46-ACB5-99ACA6D3D3E5}" type="slidenum">
               <a:rPr lang="en-US" smtClean="0"/>
-              <a:t>12</a:t>
+              <a:t>15</a:t>
             </a:fld>
             <a:endParaRPr lang="en-US"/>
           </a:p>
@@ -4901,7 +4907,7 @@
             <a:fld id="{B61BEF0D-F0BB-DE4B-95CE-6DB70DBA9567}" type="datetimeFigureOut">
               <a:rPr lang="en-US" smtClean="0"/>
               <a:pPr/>
-              <a:t>11/14/19</a:t>
+              <a:t>11/18/19</a:t>
             </a:fld>
             <a:endParaRPr lang="en-US" dirty="0"/>
           </a:p>
@@ -5073,7 +5079,7 @@
             <a:fld id="{B61BEF0D-F0BB-DE4B-95CE-6DB70DBA9567}" type="datetimeFigureOut">
               <a:rPr lang="en-US" smtClean="0"/>
               <a:pPr/>
-              <a:t>11/14/19</a:t>
+              <a:t>11/18/19</a:t>
             </a:fld>
             <a:endParaRPr lang="en-US" dirty="0"/>
           </a:p>
@@ -5255,7 +5261,7 @@
             <a:fld id="{B61BEF0D-F0BB-DE4B-95CE-6DB70DBA9567}" type="datetimeFigureOut">
               <a:rPr lang="en-US" smtClean="0"/>
               <a:pPr/>
-              <a:t>11/14/19</a:t>
+              <a:t>11/18/19</a:t>
             </a:fld>
             <a:endParaRPr lang="en-US" dirty="0"/>
           </a:p>
@@ -5427,7 +5433,7 @@
             <a:fld id="{B61BEF0D-F0BB-DE4B-95CE-6DB70DBA9567}" type="datetimeFigureOut">
               <a:rPr lang="en-US" smtClean="0"/>
               <a:pPr/>
-              <a:t>11/14/19</a:t>
+              <a:t>11/18/19</a:t>
             </a:fld>
             <a:endParaRPr lang="en-US" dirty="0"/>
           </a:p>
@@ -5689,7 +5695,7 @@
             <a:fld id="{B61BEF0D-F0BB-DE4B-95CE-6DB70DBA9567}" type="datetimeFigureOut">
               <a:rPr lang="en-US" smtClean="0"/>
               <a:pPr/>
-              <a:t>11/14/19</a:t>
+              <a:t>11/18/19</a:t>
             </a:fld>
             <a:endParaRPr lang="en-US" dirty="0"/>
           </a:p>
@@ -5923,7 +5929,7 @@
             <a:fld id="{B61BEF0D-F0BB-DE4B-95CE-6DB70DBA9567}" type="datetimeFigureOut">
               <a:rPr lang="en-US" smtClean="0"/>
               <a:pPr/>
-              <a:t>11/14/19</a:t>
+              <a:t>11/18/19</a:t>
             </a:fld>
             <a:endParaRPr lang="en-US" dirty="0"/>
           </a:p>
@@ -6285,7 +6291,7 @@
             <a:fld id="{B61BEF0D-F0BB-DE4B-95CE-6DB70DBA9567}" type="datetimeFigureOut">
               <a:rPr lang="en-US" smtClean="0"/>
               <a:pPr/>
-              <a:t>11/14/19</a:t>
+              <a:t>11/18/19</a:t>
             </a:fld>
             <a:endParaRPr lang="en-US" dirty="0"/>
           </a:p>
@@ -6428,7 +6434,7 @@
             <a:fld id="{B61BEF0D-F0BB-DE4B-95CE-6DB70DBA9567}" type="datetimeFigureOut">
               <a:rPr lang="en-US" smtClean="0"/>
               <a:pPr/>
-              <a:t>11/14/19</a:t>
+              <a:t>11/18/19</a:t>
             </a:fld>
             <a:endParaRPr lang="en-US" dirty="0"/>
           </a:p>
@@ -6525,7 +6531,7 @@
             <a:fld id="{B61BEF0D-F0BB-DE4B-95CE-6DB70DBA9567}" type="datetimeFigureOut">
               <a:rPr lang="en-US" smtClean="0"/>
               <a:pPr/>
-              <a:t>11/14/19</a:t>
+              <a:t>11/18/19</a:t>
             </a:fld>
             <a:endParaRPr lang="en-US" dirty="0"/>
           </a:p>
@@ -6884,7 +6890,7 @@
             <a:fld id="{B61BEF0D-F0BB-DE4B-95CE-6DB70DBA9567}" type="datetimeFigureOut">
               <a:rPr lang="en-US" smtClean="0"/>
               <a:pPr/>
-              <a:t>11/14/19</a:t>
+              <a:t>11/18/19</a:t>
             </a:fld>
             <a:endParaRPr lang="en-US" dirty="0"/>
           </a:p>
@@ -7209,7 +7215,7 @@
             <a:fld id="{B61BEF0D-F0BB-DE4B-95CE-6DB70DBA9567}" type="datetimeFigureOut">
               <a:rPr lang="en-US" smtClean="0"/>
               <a:pPr/>
-              <a:t>11/14/19</a:t>
+              <a:t>11/18/19</a:t>
             </a:fld>
             <a:endParaRPr lang="en-US" dirty="0"/>
           </a:p>
@@ -7456,7 +7462,7 @@
             <a:fld id="{B61BEF0D-F0BB-DE4B-95CE-6DB70DBA9567}" type="datetimeFigureOut">
               <a:rPr lang="en-US" smtClean="0"/>
               <a:pPr/>
-              <a:t>11/14/19</a:t>
+              <a:t>11/18/19</a:t>
             </a:fld>
             <a:endParaRPr lang="en-US" dirty="0"/>
           </a:p>
@@ -8025,6 +8031,510 @@
           <p:cNvPr id="2" name="Title 1">
             <a:extLst>
               <a:ext uri="{FF2B5EF4-FFF2-40B4-BE49-F238E27FC236}">
+                <a16:creationId xmlns:a16="http://schemas.microsoft.com/office/drawing/2014/main" id="{448ED059-98E8-034B-8E8B-0E732BE2E93E}"/>
+              </a:ext>
+            </a:extLst>
+          </p:cNvPr>
+          <p:cNvSpPr>
+            <a:spLocks noGrp="1"/>
+          </p:cNvSpPr>
+          <p:nvPr>
+            <p:ph type="title"/>
+          </p:nvPr>
+        </p:nvSpPr>
+        <p:spPr>
+          <a:xfrm>
+            <a:off x="2231136" y="964692"/>
+            <a:ext cx="7729728" cy="1188720"/>
+          </a:xfrm>
+        </p:spPr>
+        <p:txBody>
+          <a:bodyPr/>
+          <a:lstStyle/>
+          <a:p>
+            <a:r>
+              <a:rPr lang="en-US"/>
+              <a:t>cost function definition</a:t>
+            </a:r>
+            <a:endParaRPr lang="en-US" dirty="0"/>
+          </a:p>
+        </p:txBody>
+      </p:sp>
+      <p:pic>
+        <p:nvPicPr>
+          <p:cNvPr id="1025" name="Picture 1" descr="MSE &#10;Inputs ">
+            <a:extLst>
+              <a:ext uri="{FF2B5EF4-FFF2-40B4-BE49-F238E27FC236}">
+                <a16:creationId xmlns:a16="http://schemas.microsoft.com/office/drawing/2014/main" id="{3FBDBB87-98FE-3F47-B29B-D245D0FB2693}"/>
+              </a:ext>
+            </a:extLst>
+          </p:cNvPr>
+          <p:cNvPicPr>
+            <a:picLocks noGrp="1" noChangeAspect="1" noChangeArrowheads="1"/>
+          </p:cNvPicPr>
+          <p:nvPr>
+            <p:ph idx="1"/>
+          </p:nvPr>
+        </p:nvPicPr>
+        <p:blipFill>
+          <a:blip r:embed="rId2">
+            <a:extLst>
+              <a:ext uri="{28A0092B-C50C-407E-A947-70E740481C1C}">
+                <a14:useLocalDpi xmlns:a14="http://schemas.microsoft.com/office/drawing/2010/main" val="0"/>
+              </a:ext>
+            </a:extLst>
+          </a:blip>
+          <a:srcRect/>
+          <a:stretch>
+            <a:fillRect/>
+          </a:stretch>
+        </p:blipFill>
+        <p:spPr bwMode="auto">
+          <a:xfrm>
+            <a:off x="2231136" y="2678766"/>
+            <a:ext cx="4139704" cy="2901763"/>
+          </a:xfrm>
+          <a:prstGeom prst="rect">
+            <a:avLst/>
+          </a:prstGeom>
+          <a:noFill/>
+          <a:extLst>
+            <a:ext uri="{909E8E84-426E-40DD-AFC4-6F175D3DCCD1}">
+              <a14:hiddenFill xmlns:a14="http://schemas.microsoft.com/office/drawing/2010/main">
+                <a:solidFill>
+                  <a:srgbClr val="FFFFFF"/>
+                </a:solidFill>
+              </a14:hiddenFill>
+            </a:ext>
+          </a:extLst>
+        </p:spPr>
+      </p:pic>
+      <p:sp>
+        <p:nvSpPr>
+          <p:cNvPr id="4" name="TextBox 3">
+            <a:extLst>
+              <a:ext uri="{FF2B5EF4-FFF2-40B4-BE49-F238E27FC236}">
+                <a16:creationId xmlns:a16="http://schemas.microsoft.com/office/drawing/2014/main" id="{27FD97C6-26D0-3E4F-BA05-03A7E07C0055}"/>
+              </a:ext>
+            </a:extLst>
+          </p:cNvPr>
+          <p:cNvSpPr txBox="1"/>
+          <p:nvPr/>
+        </p:nvSpPr>
+        <p:spPr>
+          <a:xfrm>
+            <a:off x="6725869" y="2918010"/>
+            <a:ext cx="3977990" cy="1938992"/>
+          </a:xfrm>
+          <a:prstGeom prst="rect">
+            <a:avLst/>
+          </a:prstGeom>
+          <a:noFill/>
+        </p:spPr>
+        <p:txBody>
+          <a:bodyPr wrap="square" rtlCol="0">
+            <a:spAutoFit/>
+          </a:bodyPr>
+          <a:lstStyle/>
+          <a:p>
+            <a:r>
+              <a:rPr lang="en-US" sz="2000" b="1" dirty="0"/>
+              <a:t>Mean Squared Error</a:t>
+            </a:r>
+          </a:p>
+          <a:p>
+            <a:endParaRPr lang="en-US" sz="2000" dirty="0"/>
+          </a:p>
+          <a:p>
+            <a:pPr marL="342900" indent="-342900">
+              <a:buFont typeface="Arial" panose="020B0604020202020204" pitchFamily="34" charset="0"/>
+              <a:buChar char="•"/>
+            </a:pPr>
+            <a:r>
+              <a:rPr lang="en-US" sz="2000" dirty="0"/>
+              <a:t>One of the simple cost function.</a:t>
+            </a:r>
+          </a:p>
+          <a:p>
+            <a:pPr marL="342900" indent="-342900">
+              <a:buFont typeface="Arial" panose="020B0604020202020204" pitchFamily="34" charset="0"/>
+              <a:buChar char="•"/>
+            </a:pPr>
+            <a:r>
+              <a:rPr lang="en-US" sz="2000" dirty="0"/>
+              <a:t>Measures the averaged square error between the predicted and actual values</a:t>
+            </a:r>
+          </a:p>
+        </p:txBody>
+      </p:sp>
+    </p:spTree>
+    <p:extLst>
+      <p:ext uri="{BB962C8B-B14F-4D97-AF65-F5344CB8AC3E}">
+        <p14:creationId xmlns:p14="http://schemas.microsoft.com/office/powerpoint/2010/main" val="1460231966"/>
+      </p:ext>
+    </p:extLst>
+  </p:cSld>
+  <p:clrMapOvr>
+    <a:masterClrMapping/>
+  </p:clrMapOvr>
+</p:sld>
+</file>
+
+<file path=ppt/slides/slide11.xml><?xml version="1.0" encoding="utf-8"?>
+<p:sld xmlns:a="http://schemas.openxmlformats.org/drawingml/2006/main" xmlns:r="http://schemas.openxmlformats.org/officeDocument/2006/relationships" xmlns:p="http://schemas.openxmlformats.org/presentationml/2006/main">
+  <p:cSld>
+    <p:bg>
+      <p:bgPr>
+        <a:solidFill>
+          <a:schemeClr val="bg1">
+            <a:lumMod val="95000"/>
+          </a:schemeClr>
+        </a:solidFill>
+        <a:effectLst/>
+      </p:bgPr>
+    </p:bg>
+    <p:spTree>
+      <p:nvGrpSpPr>
+        <p:cNvPr id="1" name=""/>
+        <p:cNvGrpSpPr/>
+        <p:nvPr/>
+      </p:nvGrpSpPr>
+      <p:grpSpPr>
+        <a:xfrm>
+          <a:off x="0" y="0"/>
+          <a:ext cx="0" cy="0"/>
+          <a:chOff x="0" y="0"/>
+          <a:chExt cx="0" cy="0"/>
+        </a:xfrm>
+      </p:grpSpPr>
+      <p:sp>
+        <p:nvSpPr>
+          <p:cNvPr id="2" name="Title 1">
+            <a:extLst>
+              <a:ext uri="{FF2B5EF4-FFF2-40B4-BE49-F238E27FC236}">
+                <a16:creationId xmlns:a16="http://schemas.microsoft.com/office/drawing/2014/main" id="{E99C8CBB-974C-9644-AE33-3779E019383D}"/>
+              </a:ext>
+            </a:extLst>
+          </p:cNvPr>
+          <p:cNvSpPr>
+            <a:spLocks noGrp="1"/>
+          </p:cNvSpPr>
+          <p:nvPr>
+            <p:ph type="title"/>
+          </p:nvPr>
+        </p:nvSpPr>
+        <p:spPr>
+          <a:xfrm>
+            <a:off x="804672" y="964692"/>
+            <a:ext cx="3066937" cy="1188720"/>
+          </a:xfrm>
+        </p:spPr>
+        <p:txBody>
+          <a:bodyPr vert="horz" lIns="182880" tIns="182880" rIns="182880" bIns="182880" rtlCol="0" anchor="ctr">
+            <a:normAutofit/>
+          </a:bodyPr>
+          <a:lstStyle/>
+          <a:p>
+            <a:r>
+              <a:rPr lang="en-US" dirty="0"/>
+              <a:t>models</a:t>
+            </a:r>
+          </a:p>
+        </p:txBody>
+      </p:sp>
+      <p:sp>
+        <p:nvSpPr>
+          <p:cNvPr id="3" name="Content Placeholder 2">
+            <a:extLst>
+              <a:ext uri="{FF2B5EF4-FFF2-40B4-BE49-F238E27FC236}">
+                <a16:creationId xmlns:a16="http://schemas.microsoft.com/office/drawing/2014/main" id="{4E989DE7-DFB2-374A-B8DC-20E5744F94FB}"/>
+              </a:ext>
+            </a:extLst>
+          </p:cNvPr>
+          <p:cNvSpPr>
+            <a:spLocks noGrp="1"/>
+          </p:cNvSpPr>
+          <p:nvPr>
+            <p:ph sz="half" idx="1"/>
+          </p:nvPr>
+        </p:nvSpPr>
+        <p:spPr>
+          <a:xfrm>
+            <a:off x="803244" y="2638044"/>
+            <a:ext cx="3063765" cy="3263206"/>
+          </a:xfrm>
+        </p:spPr>
+        <p:txBody>
+          <a:bodyPr vert="horz" lIns="91440" tIns="45720" rIns="91440" bIns="45720" rtlCol="0">
+            <a:normAutofit/>
+          </a:bodyPr>
+          <a:lstStyle/>
+          <a:p>
+            <a:pPr>
+              <a:lnSpc>
+                <a:spcPct val="90000"/>
+              </a:lnSpc>
+            </a:pPr>
+            <a:r>
+              <a:rPr lang="en-US" b="1" dirty="0"/>
+              <a:t>Latent Factor Based or Matrix Factorization (Embedding Model using </a:t>
+            </a:r>
+            <a:r>
+              <a:rPr lang="en-US" b="1"/>
+              <a:t>Keras</a:t>
+            </a:r>
+            <a:r>
+              <a:rPr lang="en-US" b="1" dirty="0"/>
+              <a:t>) has the following structure</a:t>
+            </a:r>
+            <a:endParaRPr lang="en-US" b="1"/>
+          </a:p>
+          <a:p>
+            <a:pPr marL="571500" lvl="1">
+              <a:lnSpc>
+                <a:spcPct val="90000"/>
+              </a:lnSpc>
+            </a:pPr>
+            <a:r>
+              <a:rPr lang="en-US" dirty="0"/>
+              <a:t>Input for both books and users</a:t>
+            </a:r>
+            <a:endParaRPr lang="en-US"/>
+          </a:p>
+          <a:p>
+            <a:pPr marL="571500" lvl="1">
+              <a:lnSpc>
+                <a:spcPct val="90000"/>
+              </a:lnSpc>
+            </a:pPr>
+            <a:r>
+              <a:rPr lang="en-US" dirty="0"/>
+              <a:t>Embeddings for books and users</a:t>
+            </a:r>
+            <a:endParaRPr lang="en-US"/>
+          </a:p>
+          <a:p>
+            <a:pPr marL="571500" lvl="1">
+              <a:lnSpc>
+                <a:spcPct val="90000"/>
+              </a:lnSpc>
+            </a:pPr>
+            <a:r>
+              <a:rPr lang="en-US" dirty="0"/>
+              <a:t>Combines embeddings using a dot product</a:t>
+            </a:r>
+            <a:endParaRPr lang="en-US"/>
+          </a:p>
+          <a:p>
+            <a:pPr lvl="1">
+              <a:lnSpc>
+                <a:spcPct val="90000"/>
+              </a:lnSpc>
+            </a:pPr>
+            <a:endParaRPr lang="en-US" b="1"/>
+          </a:p>
+          <a:p>
+            <a:pPr>
+              <a:lnSpc>
+                <a:spcPct val="90000"/>
+              </a:lnSpc>
+            </a:pPr>
+            <a:endParaRPr lang="en-US"/>
+          </a:p>
+        </p:txBody>
+      </p:sp>
+      <p:sp>
+        <p:nvSpPr>
+          <p:cNvPr id="13" name="Rectangle 12">
+            <a:extLst>
+              <a:ext uri="{FF2B5EF4-FFF2-40B4-BE49-F238E27FC236}">
+                <a16:creationId xmlns:a16="http://schemas.microsoft.com/office/drawing/2014/main" id="{3BBEBD03-E4CE-4B72-8DF2-6E737BDDFBD4}"/>
+              </a:ext>
+              <a:ext uri="{C183D7F6-B498-43B3-948B-1728B52AA6E4}">
+                <adec:decorative xmlns:adec="http://schemas.microsoft.com/office/drawing/2017/decorative" val="1"/>
+              </a:ext>
+            </a:extLst>
+          </p:cNvPr>
+          <p:cNvSpPr>
+            <a:spLocks noGrp="1" noRot="1" noChangeAspect="1" noMove="1" noResize="1" noEditPoints="1" noAdjustHandles="1" noChangeArrowheads="1" noChangeShapeType="1" noTextEdit="1"/>
+          </p:cNvSpPr>
+          <p:nvPr>
+            <p:extLst>
+              <p:ext uri="{386F3935-93C4-4BCD-93E2-E3B085C9AB24}">
+                <p16:designElem xmlns:p16="http://schemas.microsoft.com/office/powerpoint/2015/main" val="1"/>
+              </p:ext>
+            </p:extLst>
+          </p:nvPr>
+        </p:nvSpPr>
+        <p:spPr>
+          <a:xfrm>
+            <a:off x="4494182" y="964692"/>
+            <a:ext cx="6885432" cy="4936558"/>
+          </a:xfrm>
+          <a:prstGeom prst="rect">
+            <a:avLst/>
+          </a:prstGeom>
+          <a:noFill/>
+          <a:ln w="31750" cap="sq">
+            <a:solidFill>
+              <a:srgbClr val="FFFFFF"/>
+            </a:solidFill>
+            <a:miter lim="800000"/>
+          </a:ln>
+        </p:spPr>
+        <p:style>
+          <a:lnRef idx="2">
+            <a:schemeClr val="accent1">
+              <a:shade val="50000"/>
+            </a:schemeClr>
+          </a:lnRef>
+          <a:fillRef idx="1">
+            <a:schemeClr val="accent1"/>
+          </a:fillRef>
+          <a:effectRef idx="0">
+            <a:schemeClr val="accent1"/>
+          </a:effectRef>
+          <a:fontRef idx="minor">
+            <a:schemeClr val="lt1"/>
+          </a:fontRef>
+        </p:style>
+        <p:txBody>
+          <a:bodyPr rtlCol="0" anchor="ctr"/>
+          <a:lstStyle/>
+          <a:p>
+            <a:pPr algn="ctr"/>
+            <a:endParaRPr lang="en-US" dirty="0"/>
+          </a:p>
+        </p:txBody>
+      </p:sp>
+      <p:sp>
+        <p:nvSpPr>
+          <p:cNvPr id="15" name="Rectangle 14">
+            <a:extLst>
+              <a:ext uri="{FF2B5EF4-FFF2-40B4-BE49-F238E27FC236}">
+                <a16:creationId xmlns:a16="http://schemas.microsoft.com/office/drawing/2014/main" id="{77221359-7E5B-428B-8817-A7C5104279C4}"/>
+              </a:ext>
+              <a:ext uri="{C183D7F6-B498-43B3-948B-1728B52AA6E4}">
+                <adec:decorative xmlns:adec="http://schemas.microsoft.com/office/drawing/2017/decorative" val="1"/>
+              </a:ext>
+            </a:extLst>
+          </p:cNvPr>
+          <p:cNvSpPr>
+            <a:spLocks noGrp="1" noRot="1" noChangeAspect="1" noMove="1" noResize="1" noEditPoints="1" noAdjustHandles="1" noChangeArrowheads="1" noChangeShapeType="1" noTextEdit="1"/>
+          </p:cNvSpPr>
+          <p:nvPr>
+            <p:extLst>
+              <p:ext uri="{386F3935-93C4-4BCD-93E2-E3B085C9AB24}">
+                <p16:designElem xmlns:p16="http://schemas.microsoft.com/office/powerpoint/2015/main" val="1"/>
+              </p:ext>
+            </p:extLst>
+          </p:nvPr>
+        </p:nvSpPr>
+        <p:spPr>
+          <a:xfrm>
+            <a:off x="4657802" y="1128683"/>
+            <a:ext cx="6558192" cy="4608576"/>
+          </a:xfrm>
+          <a:prstGeom prst="rect">
+            <a:avLst/>
+          </a:prstGeom>
+          <a:solidFill>
+            <a:srgbClr val="FFFFFF"/>
+          </a:solidFill>
+          <a:ln>
+            <a:noFill/>
+          </a:ln>
+        </p:spPr>
+        <p:style>
+          <a:lnRef idx="2">
+            <a:schemeClr val="accent1">
+              <a:shade val="50000"/>
+            </a:schemeClr>
+          </a:lnRef>
+          <a:fillRef idx="1">
+            <a:schemeClr val="accent1"/>
+          </a:fillRef>
+          <a:effectRef idx="0">
+            <a:schemeClr val="accent1"/>
+          </a:effectRef>
+          <a:fontRef idx="minor">
+            <a:schemeClr val="lt1"/>
+          </a:fontRef>
+        </p:style>
+        <p:txBody>
+          <a:bodyPr rtlCol="0" anchor="ctr"/>
+          <a:lstStyle/>
+          <a:p>
+            <a:pPr algn="ctr"/>
+            <a:endParaRPr lang="en-US"/>
+          </a:p>
+        </p:txBody>
+      </p:sp>
+      <p:pic>
+        <p:nvPicPr>
+          <p:cNvPr id="8" name="Picture 7" descr="A screenshot of a social media post&#10;&#10;Description automatically generated">
+            <a:extLst>
+              <a:ext uri="{FF2B5EF4-FFF2-40B4-BE49-F238E27FC236}">
+                <a16:creationId xmlns:a16="http://schemas.microsoft.com/office/drawing/2014/main" id="{751B6808-2222-494F-B112-5AFDFC2D41ED}"/>
+              </a:ext>
+            </a:extLst>
+          </p:cNvPr>
+          <p:cNvPicPr>
+            <a:picLocks noChangeAspect="1"/>
+          </p:cNvPicPr>
+          <p:nvPr/>
+        </p:nvPicPr>
+        <p:blipFill>
+          <a:blip r:embed="rId2"/>
+          <a:stretch>
+            <a:fillRect/>
+          </a:stretch>
+        </p:blipFill>
+        <p:spPr>
+          <a:xfrm>
+            <a:off x="4823366" y="2125288"/>
+            <a:ext cx="6227064" cy="2615366"/>
+          </a:xfrm>
+          <a:prstGeom prst="rect">
+            <a:avLst/>
+          </a:prstGeom>
+        </p:spPr>
+      </p:pic>
+    </p:spTree>
+    <p:extLst>
+      <p:ext uri="{BB962C8B-B14F-4D97-AF65-F5344CB8AC3E}">
+        <p14:creationId xmlns:p14="http://schemas.microsoft.com/office/powerpoint/2010/main" val="2707971681"/>
+      </p:ext>
+    </p:extLst>
+  </p:cSld>
+  <p:clrMapOvr>
+    <a:masterClrMapping/>
+  </p:clrMapOvr>
+</p:sld>
+</file>
+
+<file path=ppt/slides/slide12.xml><?xml version="1.0" encoding="utf-8"?>
+<p:sld xmlns:a="http://schemas.openxmlformats.org/drawingml/2006/main" xmlns:r="http://schemas.openxmlformats.org/officeDocument/2006/relationships" xmlns:p="http://schemas.openxmlformats.org/presentationml/2006/main">
+  <p:cSld>
+    <p:spTree>
+      <p:nvGrpSpPr>
+        <p:cNvPr id="1" name=""/>
+        <p:cNvGrpSpPr/>
+        <p:nvPr/>
+      </p:nvGrpSpPr>
+      <p:grpSpPr>
+        <a:xfrm>
+          <a:off x="0" y="0"/>
+          <a:ext cx="0" cy="0"/>
+          <a:chOff x="0" y="0"/>
+          <a:chExt cx="0" cy="0"/>
+        </a:xfrm>
+      </p:grpSpPr>
+      <p:sp>
+        <p:nvSpPr>
+          <p:cNvPr id="2" name="Title 1">
+            <a:extLst>
+              <a:ext uri="{FF2B5EF4-FFF2-40B4-BE49-F238E27FC236}">
                 <a16:creationId xmlns:a16="http://schemas.microsoft.com/office/drawing/2014/main" id="{2AF8A1CF-64DE-DE40-B1A7-FDB59CF6621A}"/>
               </a:ext>
             </a:extLst>
@@ -8064,7 +8574,12 @@
             <p:ph sz="half" idx="1"/>
           </p:nvPr>
         </p:nvSpPr>
-        <p:spPr/>
+        <p:spPr>
+          <a:xfrm>
+            <a:off x="2231136" y="2810315"/>
+            <a:ext cx="4271771" cy="3101982"/>
+          </a:xfrm>
+        </p:spPr>
         <p:txBody>
           <a:bodyPr/>
           <a:lstStyle/>
@@ -8077,21 +8592,21 @@
           <a:p>
             <a:pPr lvl="1"/>
             <a:r>
-              <a:rPr lang="en-US" dirty="0"/>
+              <a:rPr lang="en-US" sz="1800" dirty="0"/>
               <a:t>Using two layers</a:t>
             </a:r>
           </a:p>
           <a:p>
             <a:pPr lvl="1"/>
             <a:r>
-              <a:rPr lang="en-US" dirty="0"/>
-              <a:t>Communication in both directions, not between neurons</a:t>
+              <a:rPr lang="en-US" sz="1800" dirty="0"/>
+              <a:t>Communication in both directions, not between neurons in the same layer</a:t>
             </a:r>
           </a:p>
           <a:p>
             <a:pPr lvl="1"/>
             <a:r>
-              <a:rPr lang="en-US" dirty="0"/>
+              <a:rPr lang="en-US" sz="1800" dirty="0"/>
               <a:t>Learned of the probability of distribution of book ratings</a:t>
             </a:r>
           </a:p>
@@ -8139,7 +8654,114 @@
 </p:sld>
 </file>
 
-<file path=ppt/slides/slide11.xml><?xml version="1.0" encoding="utf-8"?>
+<file path=ppt/slides/slide13.xml><?xml version="1.0" encoding="utf-8"?>
+<p:sld xmlns:a="http://schemas.openxmlformats.org/drawingml/2006/main" xmlns:r="http://schemas.openxmlformats.org/officeDocument/2006/relationships" xmlns:p="http://schemas.openxmlformats.org/presentationml/2006/main">
+  <p:cSld>
+    <p:bg>
+      <p:bgPr>
+        <a:solidFill>
+          <a:schemeClr val="bg1">
+            <a:lumMod val="95000"/>
+          </a:schemeClr>
+        </a:solidFill>
+        <a:effectLst/>
+      </p:bgPr>
+    </p:bg>
+    <p:spTree>
+      <p:nvGrpSpPr>
+        <p:cNvPr id="1" name=""/>
+        <p:cNvGrpSpPr/>
+        <p:nvPr/>
+      </p:nvGrpSpPr>
+      <p:grpSpPr>
+        <a:xfrm>
+          <a:off x="0" y="0"/>
+          <a:ext cx="0" cy="0"/>
+          <a:chOff x="0" y="0"/>
+          <a:chExt cx="0" cy="0"/>
+        </a:xfrm>
+      </p:grpSpPr>
+      <p:sp>
+        <p:nvSpPr>
+          <p:cNvPr id="2" name="Title 1">
+            <a:extLst>
+              <a:ext uri="{FF2B5EF4-FFF2-40B4-BE49-F238E27FC236}">
+                <a16:creationId xmlns:a16="http://schemas.microsoft.com/office/drawing/2014/main" id="{67D38277-AE24-B045-B4DF-F56B43881BEB}"/>
+              </a:ext>
+            </a:extLst>
+          </p:cNvPr>
+          <p:cNvSpPr>
+            <a:spLocks noGrp="1"/>
+          </p:cNvSpPr>
+          <p:nvPr>
+            <p:ph type="title"/>
+          </p:nvPr>
+        </p:nvSpPr>
+        <p:spPr>
+          <a:xfrm>
+            <a:off x="2231136" y="964692"/>
+            <a:ext cx="7729728" cy="1188720"/>
+          </a:xfrm>
+        </p:spPr>
+        <p:txBody>
+          <a:bodyPr vert="horz" lIns="182880" tIns="182880" rIns="182880" bIns="182880" rtlCol="0" anchor="ctr" anchorCtr="1">
+            <a:normAutofit/>
+          </a:bodyPr>
+          <a:lstStyle/>
+          <a:p>
+            <a:r>
+              <a:rPr lang="en-US"/>
+              <a:t>Results</a:t>
+            </a:r>
+          </a:p>
+        </p:txBody>
+      </p:sp>
+      <p:pic>
+        <p:nvPicPr>
+          <p:cNvPr id="6" name="Content Placeholder 5" descr="A picture containing bird&#10;&#10;Description automatically generated">
+            <a:extLst>
+              <a:ext uri="{FF2B5EF4-FFF2-40B4-BE49-F238E27FC236}">
+                <a16:creationId xmlns:a16="http://schemas.microsoft.com/office/drawing/2014/main" id="{E2DEDCD2-C1D1-4F47-B0D7-ED17F667E0B9}"/>
+              </a:ext>
+            </a:extLst>
+          </p:cNvPr>
+          <p:cNvPicPr>
+            <a:picLocks noGrp="1" noChangeAspect="1"/>
+          </p:cNvPicPr>
+          <p:nvPr>
+            <p:ph sz="half" idx="2"/>
+          </p:nvPr>
+        </p:nvPicPr>
+        <p:blipFill>
+          <a:blip r:embed="rId2"/>
+          <a:stretch>
+            <a:fillRect/>
+          </a:stretch>
+        </p:blipFill>
+        <p:spPr>
+          <a:xfrm>
+            <a:off x="2231136" y="2638044"/>
+            <a:ext cx="7729728" cy="2280270"/>
+          </a:xfrm>
+          <a:prstGeom prst="rect">
+            <a:avLst/>
+          </a:prstGeom>
+        </p:spPr>
+      </p:pic>
+    </p:spTree>
+    <p:extLst>
+      <p:ext uri="{BB962C8B-B14F-4D97-AF65-F5344CB8AC3E}">
+        <p14:creationId xmlns:p14="http://schemas.microsoft.com/office/powerpoint/2010/main" val="506087409"/>
+      </p:ext>
+    </p:extLst>
+  </p:cSld>
+  <p:clrMapOvr>
+    <a:masterClrMapping/>
+  </p:clrMapOvr>
+</p:sld>
+</file>
+
+<file path=ppt/slides/slide14.xml><?xml version="1.0" encoding="utf-8"?>
 <p:sld xmlns:a="http://schemas.openxmlformats.org/drawingml/2006/main" xmlns:r="http://schemas.openxmlformats.org/officeDocument/2006/relationships" xmlns:p="http://schemas.openxmlformats.org/presentationml/2006/main">
   <p:cSld>
     <p:spTree>
@@ -8221,7 +8843,7 @@
             <a:pPr lvl="1"/>
             <a:r>
               <a:rPr lang="en-US" sz="1800" dirty="0"/>
-              <a:t>Retail products</a:t>
+              <a:t>Some retail products</a:t>
             </a:r>
           </a:p>
           <a:p>
@@ -8267,7 +8889,7 @@
 </p:sld>
 </file>
 
-<file path=ppt/slides/slide12.xml><?xml version="1.0" encoding="utf-8"?>
+<file path=ppt/slides/slide15.xml><?xml version="1.0" encoding="utf-8"?>
 <p:sld xmlns:a="http://schemas.openxmlformats.org/drawingml/2006/main" xmlns:r="http://schemas.openxmlformats.org/officeDocument/2006/relationships" xmlns:p="http://schemas.openxmlformats.org/presentationml/2006/main">
   <p:cSld>
     <p:spTree>
@@ -8399,7 +9021,7 @@
 </p:sld>
 </file>
 
-<file path=ppt/slides/slide13.xml><?xml version="1.0" encoding="utf-8"?>
+<file path=ppt/slides/slide16.xml><?xml version="1.0" encoding="utf-8"?>
 <p:sld xmlns:a="http://schemas.openxmlformats.org/drawingml/2006/main" xmlns:r="http://schemas.openxmlformats.org/officeDocument/2006/relationships" xmlns:p="http://schemas.openxmlformats.org/presentationml/2006/main">
   <p:cSld>
     <p:spTree>
@@ -8471,7 +9093,7 @@
 </p:sld>
 </file>
 
-<file path=ppt/slides/slide14.xml><?xml version="1.0" encoding="utf-8"?>
+<file path=ppt/slides/slide17.xml><?xml version="1.0" encoding="utf-8"?>
 <p:sld xmlns:a="http://schemas.openxmlformats.org/drawingml/2006/main" xmlns:r="http://schemas.openxmlformats.org/officeDocument/2006/relationships" xmlns:p="http://schemas.openxmlformats.org/presentationml/2006/main">
   <p:cSld>
     <p:spTree>
@@ -9075,7 +9697,7 @@
               <a:t>It came from </a:t>
             </a:r>
             <a:r>
-              <a:rPr lang="en-US" sz="2200" dirty="0" err="1">
+              <a:rPr lang="en-US" sz="2200" dirty="0">
                 <a:hlinkClick r:id="rId3"/>
               </a:rPr>
               <a:t>github</a:t>
@@ -9145,7 +9767,12 @@
             <p:ph type="title"/>
           </p:nvPr>
         </p:nvSpPr>
-        <p:spPr/>
+        <p:spPr>
+          <a:xfrm>
+            <a:off x="2231136" y="964692"/>
+            <a:ext cx="7729728" cy="1188720"/>
+          </a:xfrm>
+        </p:spPr>
         <p:txBody>
           <a:bodyPr/>
           <a:lstStyle/>
@@ -9173,7 +9800,12 @@
             <p:ph idx="1"/>
           </p:nvPr>
         </p:nvSpPr>
-        <p:spPr/>
+        <p:spPr>
+          <a:xfrm>
+            <a:off x="2231136" y="2638044"/>
+            <a:ext cx="7729728" cy="3101983"/>
+          </a:xfrm>
+        </p:spPr>
         <p:txBody>
           <a:bodyPr>
             <a:normAutofit/>
@@ -9182,38 +9814,46 @@
           <a:p>
             <a:pPr fontAlgn="base"/>
             <a:r>
-              <a:rPr lang="en-US" dirty="0" err="1"/>
+              <a:rPr lang="en-US" sz="2000" dirty="0" err="1"/>
               <a:t>Books.csv</a:t>
             </a:r>
             <a:r>
-              <a:rPr lang="en-US" dirty="0"/>
+              <a:rPr lang="en-US" sz="2000" dirty="0"/>
               <a:t> with metadata for each book. It includes book id, title, author, number of editions, publication year, language, average rating and others</a:t>
             </a:r>
           </a:p>
-          <a:p>
-            <a:pPr fontAlgn="base"/>
-            <a:r>
-              <a:rPr lang="en-US" dirty="0" err="1"/>
-              <a:t>Ratings.csv</a:t>
-            </a:r>
-            <a:r>
-              <a:rPr lang="en-US" dirty="0"/>
-              <a:t> contains the most important variables for this project, user id, book id and rating for books. All these variables are integers, specifically the given rating is into a range from 1 to 5, being 1 for the lowest rates  and 5 for the highest rates for a book.</a:t>
-            </a:r>
-          </a:p>
-          <a:p>
-            <a:pPr fontAlgn="base"/>
-            <a:r>
-              <a:rPr lang="en-US" dirty="0" err="1"/>
-              <a:t>To_read.csv</a:t>
-            </a:r>
-            <a:r>
-              <a:rPr lang="en-US" dirty="0"/>
-              <a:t>, is the file that provides user IDs and the book IDs that the user has already read.</a:t>
-            </a:r>
-          </a:p>
-        </p:txBody>
-      </p:sp>
+        </p:txBody>
+      </p:sp>
+      <p:pic>
+        <p:nvPicPr>
+          <p:cNvPr id="5" name="Picture 4" descr="A screenshot of a cell phone&#10;&#10;Description automatically generated">
+            <a:extLst>
+              <a:ext uri="{FF2B5EF4-FFF2-40B4-BE49-F238E27FC236}">
+                <a16:creationId xmlns:a16="http://schemas.microsoft.com/office/drawing/2014/main" id="{2BE717C9-ED09-634C-8DE9-C93FC66C6924}"/>
+              </a:ext>
+            </a:extLst>
+          </p:cNvPr>
+          <p:cNvPicPr>
+            <a:picLocks noChangeAspect="1"/>
+          </p:cNvPicPr>
+          <p:nvPr/>
+        </p:nvPicPr>
+        <p:blipFill>
+          <a:blip r:embed="rId3"/>
+          <a:stretch>
+            <a:fillRect/>
+          </a:stretch>
+        </p:blipFill>
+        <p:spPr>
+          <a:xfrm>
+            <a:off x="1938528" y="3864321"/>
+            <a:ext cx="8607552" cy="2028987"/>
+          </a:xfrm>
+          <a:prstGeom prst="rect">
+            <a:avLst/>
+          </a:prstGeom>
+        </p:spPr>
+      </p:pic>
     </p:spTree>
     <p:extLst>
       <p:ext uri="{BB962C8B-B14F-4D97-AF65-F5344CB8AC3E}">
@@ -9228,6 +9868,552 @@
 </file>
 
 <file path=ppt/slides/slide6.xml><?xml version="1.0" encoding="utf-8"?>
+<p:sld xmlns:a="http://schemas.openxmlformats.org/drawingml/2006/main" xmlns:r="http://schemas.openxmlformats.org/officeDocument/2006/relationships" xmlns:p="http://schemas.openxmlformats.org/presentationml/2006/main">
+  <p:cSld>
+    <p:bg>
+      <p:bgPr>
+        <a:solidFill>
+          <a:schemeClr val="bg1">
+            <a:lumMod val="95000"/>
+          </a:schemeClr>
+        </a:solidFill>
+        <a:effectLst/>
+      </p:bgPr>
+    </p:bg>
+    <p:spTree>
+      <p:nvGrpSpPr>
+        <p:cNvPr id="1" name=""/>
+        <p:cNvGrpSpPr/>
+        <p:nvPr/>
+      </p:nvGrpSpPr>
+      <p:grpSpPr>
+        <a:xfrm>
+          <a:off x="0" y="0"/>
+          <a:ext cx="0" cy="0"/>
+          <a:chOff x="0" y="0"/>
+          <a:chExt cx="0" cy="0"/>
+        </a:xfrm>
+      </p:grpSpPr>
+      <p:sp>
+        <p:nvSpPr>
+          <p:cNvPr id="2" name="Title 1">
+            <a:extLst>
+              <a:ext uri="{FF2B5EF4-FFF2-40B4-BE49-F238E27FC236}">
+                <a16:creationId xmlns:a16="http://schemas.microsoft.com/office/drawing/2014/main" id="{BD4FE5ED-5705-A144-9352-3FA912F1AAEC}"/>
+              </a:ext>
+            </a:extLst>
+          </p:cNvPr>
+          <p:cNvSpPr>
+            <a:spLocks noGrp="1"/>
+          </p:cNvSpPr>
+          <p:nvPr>
+            <p:ph type="title"/>
+          </p:nvPr>
+        </p:nvSpPr>
+        <p:spPr>
+          <a:xfrm>
+            <a:off x="804672" y="964692"/>
+            <a:ext cx="5894832" cy="1188720"/>
+          </a:xfrm>
+        </p:spPr>
+        <p:txBody>
+          <a:bodyPr>
+            <a:normAutofit/>
+          </a:bodyPr>
+          <a:lstStyle/>
+          <a:p>
+            <a:r>
+              <a:rPr lang="en-US" dirty="0"/>
+              <a:t>Attributes</a:t>
+            </a:r>
+          </a:p>
+        </p:txBody>
+      </p:sp>
+      <p:sp>
+        <p:nvSpPr>
+          <p:cNvPr id="3" name="Content Placeholder 2">
+            <a:extLst>
+              <a:ext uri="{FF2B5EF4-FFF2-40B4-BE49-F238E27FC236}">
+                <a16:creationId xmlns:a16="http://schemas.microsoft.com/office/drawing/2014/main" id="{4EB9FBF6-D9A6-E641-8166-CCD2530170F4}"/>
+              </a:ext>
+            </a:extLst>
+          </p:cNvPr>
+          <p:cNvSpPr>
+            <a:spLocks noGrp="1"/>
+          </p:cNvSpPr>
+          <p:nvPr>
+            <p:ph idx="1"/>
+          </p:nvPr>
+        </p:nvSpPr>
+        <p:spPr>
+          <a:xfrm>
+            <a:off x="803243" y="2638044"/>
+            <a:ext cx="5963317" cy="3263206"/>
+          </a:xfrm>
+        </p:spPr>
+        <p:txBody>
+          <a:bodyPr>
+            <a:normAutofit/>
+          </a:bodyPr>
+          <a:lstStyle/>
+          <a:p>
+            <a:r>
+              <a:rPr lang="en-US" sz="2400" dirty="0" err="1"/>
+              <a:t>To_read.csv</a:t>
+            </a:r>
+            <a:r>
+              <a:rPr lang="en-US" sz="2400" dirty="0"/>
+              <a:t>, is the file that provides user IDs and the book IDs that the user has already read.</a:t>
+            </a:r>
+          </a:p>
+        </p:txBody>
+      </p:sp>
+      <p:sp>
+        <p:nvSpPr>
+          <p:cNvPr id="10" name="Rectangle 9">
+            <a:extLst>
+              <a:ext uri="{FF2B5EF4-FFF2-40B4-BE49-F238E27FC236}">
+                <a16:creationId xmlns:a16="http://schemas.microsoft.com/office/drawing/2014/main" id="{A4CD5757-70DF-4A72-B8BA-D5E5ACAA82A0}"/>
+              </a:ext>
+              <a:ext uri="{C183D7F6-B498-43B3-948B-1728B52AA6E4}">
+                <adec:decorative xmlns:adec="http://schemas.microsoft.com/office/drawing/2017/decorative" val="1"/>
+              </a:ext>
+            </a:extLst>
+          </p:cNvPr>
+          <p:cNvSpPr>
+            <a:spLocks noGrp="1" noRot="1" noChangeAspect="1" noMove="1" noResize="1" noEditPoints="1" noAdjustHandles="1" noChangeArrowheads="1" noChangeShapeType="1" noTextEdit="1"/>
+          </p:cNvSpPr>
+          <p:nvPr>
+            <p:extLst>
+              <p:ext uri="{386F3935-93C4-4BCD-93E2-E3B085C9AB24}">
+                <p16:designElem xmlns:p16="http://schemas.microsoft.com/office/powerpoint/2015/main" val="1"/>
+              </p:ext>
+            </p:extLst>
+          </p:nvPr>
+        </p:nvSpPr>
+        <p:spPr>
+          <a:xfrm>
+            <a:off x="7386706" y="964692"/>
+            <a:ext cx="3986784" cy="4936558"/>
+          </a:xfrm>
+          <a:prstGeom prst="rect">
+            <a:avLst/>
+          </a:prstGeom>
+          <a:noFill/>
+          <a:ln w="31750" cap="sq">
+            <a:solidFill>
+              <a:srgbClr val="FFFFFF"/>
+            </a:solidFill>
+            <a:miter lim="800000"/>
+          </a:ln>
+        </p:spPr>
+        <p:style>
+          <a:lnRef idx="2">
+            <a:schemeClr val="accent1">
+              <a:shade val="50000"/>
+            </a:schemeClr>
+          </a:lnRef>
+          <a:fillRef idx="1">
+            <a:schemeClr val="accent1"/>
+          </a:fillRef>
+          <a:effectRef idx="0">
+            <a:schemeClr val="accent1"/>
+          </a:effectRef>
+          <a:fontRef idx="minor">
+            <a:schemeClr val="lt1"/>
+          </a:fontRef>
+        </p:style>
+        <p:txBody>
+          <a:bodyPr rtlCol="0" anchor="ctr"/>
+          <a:lstStyle/>
+          <a:p>
+            <a:pPr algn="ctr"/>
+            <a:endParaRPr lang="en-US" dirty="0"/>
+          </a:p>
+        </p:txBody>
+      </p:sp>
+      <p:sp>
+        <p:nvSpPr>
+          <p:cNvPr id="12" name="Rectangle 11">
+            <a:extLst>
+              <a:ext uri="{FF2B5EF4-FFF2-40B4-BE49-F238E27FC236}">
+                <a16:creationId xmlns:a16="http://schemas.microsoft.com/office/drawing/2014/main" id="{4EA93A49-7FC9-4173-84F4-14FF7005DE61}"/>
+              </a:ext>
+              <a:ext uri="{C183D7F6-B498-43B3-948B-1728B52AA6E4}">
+                <adec:decorative xmlns:adec="http://schemas.microsoft.com/office/drawing/2017/decorative" val="1"/>
+              </a:ext>
+            </a:extLst>
+          </p:cNvPr>
+          <p:cNvSpPr>
+            <a:spLocks noGrp="1" noRot="1" noChangeAspect="1" noMove="1" noResize="1" noEditPoints="1" noAdjustHandles="1" noChangeArrowheads="1" noChangeShapeType="1" noTextEdit="1"/>
+          </p:cNvSpPr>
+          <p:nvPr>
+            <p:extLst>
+              <p:ext uri="{386F3935-93C4-4BCD-93E2-E3B085C9AB24}">
+                <p16:designElem xmlns:p16="http://schemas.microsoft.com/office/powerpoint/2015/main" val="1"/>
+              </p:ext>
+            </p:extLst>
+          </p:nvPr>
+        </p:nvSpPr>
+        <p:spPr>
+          <a:xfrm>
+            <a:off x="7551298" y="1128683"/>
+            <a:ext cx="3657600" cy="4608576"/>
+          </a:xfrm>
+          <a:prstGeom prst="rect">
+            <a:avLst/>
+          </a:prstGeom>
+          <a:solidFill>
+            <a:srgbClr val="FFFFFF"/>
+          </a:solidFill>
+          <a:ln>
+            <a:noFill/>
+          </a:ln>
+        </p:spPr>
+        <p:style>
+          <a:lnRef idx="2">
+            <a:schemeClr val="accent1">
+              <a:shade val="50000"/>
+            </a:schemeClr>
+          </a:lnRef>
+          <a:fillRef idx="1">
+            <a:schemeClr val="accent1"/>
+          </a:fillRef>
+          <a:effectRef idx="0">
+            <a:schemeClr val="accent1"/>
+          </a:effectRef>
+          <a:fontRef idx="minor">
+            <a:schemeClr val="lt1"/>
+          </a:fontRef>
+        </p:style>
+        <p:txBody>
+          <a:bodyPr rtlCol="0" anchor="ctr"/>
+          <a:lstStyle/>
+          <a:p>
+            <a:pPr algn="ctr"/>
+            <a:endParaRPr lang="en-US"/>
+          </a:p>
+        </p:txBody>
+      </p:sp>
+      <p:pic>
+        <p:nvPicPr>
+          <p:cNvPr id="5" name="Picture 4" descr="A screenshot of a cell phone&#10;&#10;Description automatically generated">
+            <a:extLst>
+              <a:ext uri="{FF2B5EF4-FFF2-40B4-BE49-F238E27FC236}">
+                <a16:creationId xmlns:a16="http://schemas.microsoft.com/office/drawing/2014/main" id="{5A0EC55D-9CBD-6146-B01B-24868D3F7D53}"/>
+              </a:ext>
+            </a:extLst>
+          </p:cNvPr>
+          <p:cNvPicPr>
+            <a:picLocks noChangeAspect="1"/>
+          </p:cNvPicPr>
+          <p:nvPr/>
+        </p:nvPicPr>
+        <p:blipFill>
+          <a:blip r:embed="rId2"/>
+          <a:stretch>
+            <a:fillRect/>
+          </a:stretch>
+        </p:blipFill>
+        <p:spPr>
+          <a:xfrm>
+            <a:off x="7715890" y="1328553"/>
+            <a:ext cx="3328416" cy="4208836"/>
+          </a:xfrm>
+          <a:prstGeom prst="rect">
+            <a:avLst/>
+          </a:prstGeom>
+        </p:spPr>
+      </p:pic>
+    </p:spTree>
+    <p:extLst>
+      <p:ext uri="{BB962C8B-B14F-4D97-AF65-F5344CB8AC3E}">
+        <p14:creationId xmlns:p14="http://schemas.microsoft.com/office/powerpoint/2010/main" val="3251470061"/>
+      </p:ext>
+    </p:extLst>
+  </p:cSld>
+  <p:clrMapOvr>
+    <a:masterClrMapping/>
+  </p:clrMapOvr>
+</p:sld>
+</file>
+
+<file path=ppt/slides/slide7.xml><?xml version="1.0" encoding="utf-8"?>
+<p:sld xmlns:a="http://schemas.openxmlformats.org/drawingml/2006/main" xmlns:r="http://schemas.openxmlformats.org/officeDocument/2006/relationships" xmlns:p="http://schemas.openxmlformats.org/presentationml/2006/main">
+  <p:cSld>
+    <p:bg>
+      <p:bgPr>
+        <a:solidFill>
+          <a:schemeClr val="bg1">
+            <a:lumMod val="95000"/>
+          </a:schemeClr>
+        </a:solidFill>
+        <a:effectLst/>
+      </p:bgPr>
+    </p:bg>
+    <p:spTree>
+      <p:nvGrpSpPr>
+        <p:cNvPr id="1" name=""/>
+        <p:cNvGrpSpPr/>
+        <p:nvPr/>
+      </p:nvGrpSpPr>
+      <p:grpSpPr>
+        <a:xfrm>
+          <a:off x="0" y="0"/>
+          <a:ext cx="0" cy="0"/>
+          <a:chOff x="0" y="0"/>
+          <a:chExt cx="0" cy="0"/>
+        </a:xfrm>
+      </p:grpSpPr>
+      <p:sp>
+        <p:nvSpPr>
+          <p:cNvPr id="2" name="Title 1">
+            <a:extLst>
+              <a:ext uri="{FF2B5EF4-FFF2-40B4-BE49-F238E27FC236}">
+                <a16:creationId xmlns:a16="http://schemas.microsoft.com/office/drawing/2014/main" id="{B4F9EA01-7EBF-FD4B-B2A5-C52C5D9EDC8F}"/>
+              </a:ext>
+            </a:extLst>
+          </p:cNvPr>
+          <p:cNvSpPr>
+            <a:spLocks noGrp="1"/>
+          </p:cNvSpPr>
+          <p:nvPr>
+            <p:ph type="title"/>
+          </p:nvPr>
+        </p:nvSpPr>
+        <p:spPr>
+          <a:xfrm>
+            <a:off x="8312677" y="964692"/>
+            <a:ext cx="3066937" cy="1188720"/>
+          </a:xfrm>
+        </p:spPr>
+        <p:txBody>
+          <a:bodyPr>
+            <a:normAutofit/>
+          </a:bodyPr>
+          <a:lstStyle/>
+          <a:p>
+            <a:r>
+              <a:rPr lang="en-US"/>
+              <a:t>Attributes</a:t>
+            </a:r>
+            <a:endParaRPr lang="en-US" dirty="0"/>
+          </a:p>
+        </p:txBody>
+      </p:sp>
+      <p:sp>
+        <p:nvSpPr>
+          <p:cNvPr id="24" name="Rectangle 23">
+            <a:extLst>
+              <a:ext uri="{FF2B5EF4-FFF2-40B4-BE49-F238E27FC236}">
+                <a16:creationId xmlns:a16="http://schemas.microsoft.com/office/drawing/2014/main" id="{0358FD32-AA91-47A4-9758-8C172B30665A}"/>
+              </a:ext>
+              <a:ext uri="{C183D7F6-B498-43B3-948B-1728B52AA6E4}">
+                <adec:decorative xmlns:adec="http://schemas.microsoft.com/office/drawing/2017/decorative" val="1"/>
+              </a:ext>
+            </a:extLst>
+          </p:cNvPr>
+          <p:cNvSpPr>
+            <a:spLocks noGrp="1" noRot="1" noChangeAspect="1" noMove="1" noResize="1" noEditPoints="1" noAdjustHandles="1" noChangeArrowheads="1" noChangeShapeType="1" noTextEdit="1"/>
+          </p:cNvSpPr>
+          <p:nvPr>
+            <p:extLst>
+              <p:ext uri="{386F3935-93C4-4BCD-93E2-E3B085C9AB24}">
+                <p16:designElem xmlns:p16="http://schemas.microsoft.com/office/powerpoint/2015/main" val="1"/>
+              </p:ext>
+            </p:extLst>
+          </p:nvPr>
+        </p:nvSpPr>
+        <p:spPr>
+          <a:xfrm>
+            <a:off x="814795" y="964692"/>
+            <a:ext cx="6885432" cy="4936558"/>
+          </a:xfrm>
+          <a:prstGeom prst="rect">
+            <a:avLst/>
+          </a:prstGeom>
+          <a:noFill/>
+          <a:ln w="31750" cap="sq">
+            <a:solidFill>
+              <a:srgbClr val="FFFFFF"/>
+            </a:solidFill>
+            <a:miter lim="800000"/>
+          </a:ln>
+        </p:spPr>
+        <p:style>
+          <a:lnRef idx="2">
+            <a:schemeClr val="accent1">
+              <a:shade val="50000"/>
+            </a:schemeClr>
+          </a:lnRef>
+          <a:fillRef idx="1">
+            <a:schemeClr val="accent1"/>
+          </a:fillRef>
+          <a:effectRef idx="0">
+            <a:schemeClr val="accent1"/>
+          </a:effectRef>
+          <a:fontRef idx="minor">
+            <a:schemeClr val="lt1"/>
+          </a:fontRef>
+        </p:style>
+        <p:txBody>
+          <a:bodyPr rtlCol="0" anchor="ctr"/>
+          <a:lstStyle/>
+          <a:p>
+            <a:pPr algn="ctr"/>
+            <a:endParaRPr lang="en-US" dirty="0"/>
+          </a:p>
+        </p:txBody>
+      </p:sp>
+      <p:sp>
+        <p:nvSpPr>
+          <p:cNvPr id="26" name="Rectangle 25">
+            <a:extLst>
+              <a:ext uri="{FF2B5EF4-FFF2-40B4-BE49-F238E27FC236}">
+                <a16:creationId xmlns:a16="http://schemas.microsoft.com/office/drawing/2014/main" id="{86B5B18B-0170-4F1B-BF40-89BD5772C006}"/>
+              </a:ext>
+              <a:ext uri="{C183D7F6-B498-43B3-948B-1728B52AA6E4}">
+                <adec:decorative xmlns:adec="http://schemas.microsoft.com/office/drawing/2017/decorative" val="1"/>
+              </a:ext>
+            </a:extLst>
+          </p:cNvPr>
+          <p:cNvSpPr>
+            <a:spLocks noGrp="1" noRot="1" noChangeAspect="1" noMove="1" noResize="1" noEditPoints="1" noAdjustHandles="1" noChangeArrowheads="1" noChangeShapeType="1" noTextEdit="1"/>
+          </p:cNvSpPr>
+          <p:nvPr>
+            <p:extLst>
+              <p:ext uri="{386F3935-93C4-4BCD-93E2-E3B085C9AB24}">
+                <p16:designElem xmlns:p16="http://schemas.microsoft.com/office/powerpoint/2015/main" val="1"/>
+              </p:ext>
+            </p:extLst>
+          </p:nvPr>
+        </p:nvSpPr>
+        <p:spPr>
+          <a:xfrm>
+            <a:off x="978415" y="1128683"/>
+            <a:ext cx="6558192" cy="4608576"/>
+          </a:xfrm>
+          <a:prstGeom prst="rect">
+            <a:avLst/>
+          </a:prstGeom>
+          <a:solidFill>
+            <a:srgbClr val="FFFFFF"/>
+          </a:solidFill>
+          <a:ln>
+            <a:noFill/>
+          </a:ln>
+        </p:spPr>
+        <p:style>
+          <a:lnRef idx="2">
+            <a:schemeClr val="accent1">
+              <a:shade val="50000"/>
+            </a:schemeClr>
+          </a:lnRef>
+          <a:fillRef idx="1">
+            <a:schemeClr val="accent1"/>
+          </a:fillRef>
+          <a:effectRef idx="0">
+            <a:schemeClr val="accent1"/>
+          </a:effectRef>
+          <a:fontRef idx="minor">
+            <a:schemeClr val="lt1"/>
+          </a:fontRef>
+        </p:style>
+        <p:txBody>
+          <a:bodyPr rtlCol="0" anchor="ctr"/>
+          <a:lstStyle/>
+          <a:p>
+            <a:pPr algn="ctr"/>
+            <a:endParaRPr lang="en-US"/>
+          </a:p>
+        </p:txBody>
+      </p:sp>
+      <p:pic>
+        <p:nvPicPr>
+          <p:cNvPr id="5" name="Picture 4" descr="A close up of a keyboard&#10;&#10;Description automatically generated">
+            <a:extLst>
+              <a:ext uri="{FF2B5EF4-FFF2-40B4-BE49-F238E27FC236}">
+                <a16:creationId xmlns:a16="http://schemas.microsoft.com/office/drawing/2014/main" id="{745CAB0D-6699-B14B-9164-2FB8EC8E9D01}"/>
+              </a:ext>
+            </a:extLst>
+          </p:cNvPr>
+          <p:cNvPicPr>
+            <a:picLocks noChangeAspect="1"/>
+          </p:cNvPicPr>
+          <p:nvPr/>
+        </p:nvPicPr>
+        <p:blipFill>
+          <a:blip r:embed="rId2"/>
+          <a:stretch>
+            <a:fillRect/>
+          </a:stretch>
+        </p:blipFill>
+        <p:spPr>
+          <a:xfrm>
+            <a:off x="2031363" y="1293275"/>
+            <a:ext cx="4452296" cy="4279392"/>
+          </a:xfrm>
+          <a:prstGeom prst="rect">
+            <a:avLst/>
+          </a:prstGeom>
+        </p:spPr>
+      </p:pic>
+      <p:sp>
+        <p:nvSpPr>
+          <p:cNvPr id="3" name="Content Placeholder 2">
+            <a:extLst>
+              <a:ext uri="{FF2B5EF4-FFF2-40B4-BE49-F238E27FC236}">
+                <a16:creationId xmlns:a16="http://schemas.microsoft.com/office/drawing/2014/main" id="{8D1A2FC6-D9E6-024E-9855-1C877769BA06}"/>
+              </a:ext>
+            </a:extLst>
+          </p:cNvPr>
+          <p:cNvSpPr>
+            <a:spLocks noGrp="1"/>
+          </p:cNvSpPr>
+          <p:nvPr>
+            <p:ph idx="1"/>
+          </p:nvPr>
+        </p:nvSpPr>
+        <p:spPr>
+          <a:xfrm>
+            <a:off x="8311249" y="2638044"/>
+            <a:ext cx="3063765" cy="3263206"/>
+          </a:xfrm>
+        </p:spPr>
+        <p:txBody>
+          <a:bodyPr>
+            <a:normAutofit lnSpcReduction="10000"/>
+          </a:bodyPr>
+          <a:lstStyle/>
+          <a:p>
+            <a:r>
+              <a:rPr lang="en-US" sz="2000" dirty="0" err="1"/>
+              <a:t>Ratings.csv</a:t>
+            </a:r>
+            <a:r>
+              <a:rPr lang="en-US" sz="2000" dirty="0"/>
+              <a:t> contains the most important variables for this project, user id, book id and rating for books. All these variables are integers, specifically the given rating is into a range from 1 to 5, being 1 for the lowest rates  and 5 for the highest rates for a book.</a:t>
+            </a:r>
+          </a:p>
+          <a:p>
+            <a:endParaRPr lang="en-US" dirty="0"/>
+          </a:p>
+        </p:txBody>
+      </p:sp>
+    </p:spTree>
+    <p:extLst>
+      <p:ext uri="{BB962C8B-B14F-4D97-AF65-F5344CB8AC3E}">
+        <p14:creationId xmlns:p14="http://schemas.microsoft.com/office/powerpoint/2010/main" val="2734997487"/>
+      </p:ext>
+    </p:extLst>
+  </p:cSld>
+  <p:clrMapOvr>
+    <a:masterClrMapping/>
+  </p:clrMapOvr>
+</p:sld>
+</file>
+
+<file path=ppt/slides/slide8.xml><?xml version="1.0" encoding="utf-8"?>
 <p:sld xmlns:a="http://schemas.openxmlformats.org/drawingml/2006/main" xmlns:r="http://schemas.openxmlformats.org/officeDocument/2006/relationships" xmlns:p="http://schemas.openxmlformats.org/presentationml/2006/main">
   <p:cSld>
     <p:bg>
@@ -9370,7 +10556,7 @@
 </p:sld>
 </file>
 
-<file path=ppt/slides/slide7.xml><?xml version="1.0" encoding="utf-8"?>
+<file path=ppt/slides/slide9.xml><?xml version="1.0" encoding="utf-8"?>
 <p:sld xmlns:a="http://schemas.openxmlformats.org/drawingml/2006/main" xmlns:r="http://schemas.openxmlformats.org/officeDocument/2006/relationships" xmlns:p="http://schemas.openxmlformats.org/presentationml/2006/main">
   <p:cSld>
     <p:spTree>
@@ -10665,328 +11851,6 @@
 </p:sld>
 </file>
 
-<file path=ppt/slides/slide8.xml><?xml version="1.0" encoding="utf-8"?>
-<p:sld xmlns:a="http://schemas.openxmlformats.org/drawingml/2006/main" xmlns:r="http://schemas.openxmlformats.org/officeDocument/2006/relationships" xmlns:p="http://schemas.openxmlformats.org/presentationml/2006/main">
-  <p:cSld>
-    <p:spTree>
-      <p:nvGrpSpPr>
-        <p:cNvPr id="1" name=""/>
-        <p:cNvGrpSpPr/>
-        <p:nvPr/>
-      </p:nvGrpSpPr>
-      <p:grpSpPr>
-        <a:xfrm>
-          <a:off x="0" y="0"/>
-          <a:ext cx="0" cy="0"/>
-          <a:chOff x="0" y="0"/>
-          <a:chExt cx="0" cy="0"/>
-        </a:xfrm>
-      </p:grpSpPr>
-      <p:sp>
-        <p:nvSpPr>
-          <p:cNvPr id="2" name="Title 1">
-            <a:extLst>
-              <a:ext uri="{FF2B5EF4-FFF2-40B4-BE49-F238E27FC236}">
-                <a16:creationId xmlns:a16="http://schemas.microsoft.com/office/drawing/2014/main" id="{448ED059-98E8-034B-8E8B-0E732BE2E93E}"/>
-              </a:ext>
-            </a:extLst>
-          </p:cNvPr>
-          <p:cNvSpPr>
-            <a:spLocks noGrp="1"/>
-          </p:cNvSpPr>
-          <p:nvPr>
-            <p:ph type="title"/>
-          </p:nvPr>
-        </p:nvSpPr>
-        <p:spPr>
-          <a:xfrm>
-            <a:off x="2231136" y="964692"/>
-            <a:ext cx="7729728" cy="1188720"/>
-          </a:xfrm>
-        </p:spPr>
-        <p:txBody>
-          <a:bodyPr/>
-          <a:lstStyle/>
-          <a:p>
-            <a:r>
-              <a:rPr lang="en-US"/>
-              <a:t>cost function definition</a:t>
-            </a:r>
-            <a:endParaRPr lang="en-US" dirty="0"/>
-          </a:p>
-        </p:txBody>
-      </p:sp>
-      <p:pic>
-        <p:nvPicPr>
-          <p:cNvPr id="1025" name="Picture 1" descr="MSE &#10;Inputs ">
-            <a:extLst>
-              <a:ext uri="{FF2B5EF4-FFF2-40B4-BE49-F238E27FC236}">
-                <a16:creationId xmlns:a16="http://schemas.microsoft.com/office/drawing/2014/main" id="{3FBDBB87-98FE-3F47-B29B-D245D0FB2693}"/>
-              </a:ext>
-            </a:extLst>
-          </p:cNvPr>
-          <p:cNvPicPr>
-            <a:picLocks noGrp="1" noChangeAspect="1" noChangeArrowheads="1"/>
-          </p:cNvPicPr>
-          <p:nvPr>
-            <p:ph idx="1"/>
-          </p:nvPr>
-        </p:nvPicPr>
-        <p:blipFill>
-          <a:blip r:embed="rId2">
-            <a:extLst>
-              <a:ext uri="{28A0092B-C50C-407E-A947-70E740481C1C}">
-                <a14:useLocalDpi xmlns:a14="http://schemas.microsoft.com/office/drawing/2010/main" val="0"/>
-              </a:ext>
-            </a:extLst>
-          </a:blip>
-          <a:srcRect/>
-          <a:stretch>
-            <a:fillRect/>
-          </a:stretch>
-        </p:blipFill>
-        <p:spPr bwMode="auto">
-          <a:xfrm>
-            <a:off x="2231136" y="2678766"/>
-            <a:ext cx="4139704" cy="2901763"/>
-          </a:xfrm>
-          <a:prstGeom prst="rect">
-            <a:avLst/>
-          </a:prstGeom>
-          <a:noFill/>
-          <a:extLst>
-            <a:ext uri="{909E8E84-426E-40DD-AFC4-6F175D3DCCD1}">
-              <a14:hiddenFill xmlns:a14="http://schemas.microsoft.com/office/drawing/2010/main">
-                <a:solidFill>
-                  <a:srgbClr val="FFFFFF"/>
-                </a:solidFill>
-              </a14:hiddenFill>
-            </a:ext>
-          </a:extLst>
-        </p:spPr>
-      </p:pic>
-      <p:sp>
-        <p:nvSpPr>
-          <p:cNvPr id="4" name="TextBox 3">
-            <a:extLst>
-              <a:ext uri="{FF2B5EF4-FFF2-40B4-BE49-F238E27FC236}">
-                <a16:creationId xmlns:a16="http://schemas.microsoft.com/office/drawing/2014/main" id="{27FD97C6-26D0-3E4F-BA05-03A7E07C0055}"/>
-              </a:ext>
-            </a:extLst>
-          </p:cNvPr>
-          <p:cNvSpPr txBox="1"/>
-          <p:nvPr/>
-        </p:nvSpPr>
-        <p:spPr>
-          <a:xfrm>
-            <a:off x="6725869" y="2918010"/>
-            <a:ext cx="3977990" cy="1938992"/>
-          </a:xfrm>
-          <a:prstGeom prst="rect">
-            <a:avLst/>
-          </a:prstGeom>
-          <a:noFill/>
-        </p:spPr>
-        <p:txBody>
-          <a:bodyPr wrap="square" rtlCol="0">
-            <a:spAutoFit/>
-          </a:bodyPr>
-          <a:lstStyle/>
-          <a:p>
-            <a:r>
-              <a:rPr lang="en-US" sz="2000" b="1" dirty="0"/>
-              <a:t>Mean Squared Error</a:t>
-            </a:r>
-          </a:p>
-          <a:p>
-            <a:endParaRPr lang="en-US" sz="2000" dirty="0"/>
-          </a:p>
-          <a:p>
-            <a:pPr marL="342900" indent="-342900">
-              <a:buFont typeface="Arial" panose="020B0604020202020204" pitchFamily="34" charset="0"/>
-              <a:buChar char="•"/>
-            </a:pPr>
-            <a:r>
-              <a:rPr lang="en-US" sz="2000" dirty="0"/>
-              <a:t>One of the simple cost function.</a:t>
-            </a:r>
-          </a:p>
-          <a:p>
-            <a:pPr marL="342900" indent="-342900">
-              <a:buFont typeface="Arial" panose="020B0604020202020204" pitchFamily="34" charset="0"/>
-              <a:buChar char="•"/>
-            </a:pPr>
-            <a:r>
-              <a:rPr lang="en-US" sz="2000" dirty="0"/>
-              <a:t>Measures the averaged square error between the predicted and actual values</a:t>
-            </a:r>
-          </a:p>
-        </p:txBody>
-      </p:sp>
-    </p:spTree>
-    <p:extLst>
-      <p:ext uri="{BB962C8B-B14F-4D97-AF65-F5344CB8AC3E}">
-        <p14:creationId xmlns:p14="http://schemas.microsoft.com/office/powerpoint/2010/main" val="1460231966"/>
-      </p:ext>
-    </p:extLst>
-  </p:cSld>
-  <p:clrMapOvr>
-    <a:masterClrMapping/>
-  </p:clrMapOvr>
-</p:sld>
-</file>
-
-<file path=ppt/slides/slide9.xml><?xml version="1.0" encoding="utf-8"?>
-<p:sld xmlns:a="http://schemas.openxmlformats.org/drawingml/2006/main" xmlns:r="http://schemas.openxmlformats.org/officeDocument/2006/relationships" xmlns:p="http://schemas.openxmlformats.org/presentationml/2006/main">
-  <p:cSld>
-    <p:spTree>
-      <p:nvGrpSpPr>
-        <p:cNvPr id="1" name=""/>
-        <p:cNvGrpSpPr/>
-        <p:nvPr/>
-      </p:nvGrpSpPr>
-      <p:grpSpPr>
-        <a:xfrm>
-          <a:off x="0" y="0"/>
-          <a:ext cx="0" cy="0"/>
-          <a:chOff x="0" y="0"/>
-          <a:chExt cx="0" cy="0"/>
-        </a:xfrm>
-      </p:grpSpPr>
-      <p:sp>
-        <p:nvSpPr>
-          <p:cNvPr id="2" name="Title 1">
-            <a:extLst>
-              <a:ext uri="{FF2B5EF4-FFF2-40B4-BE49-F238E27FC236}">
-                <a16:creationId xmlns:a16="http://schemas.microsoft.com/office/drawing/2014/main" id="{E99C8CBB-974C-9644-AE33-3779E019383D}"/>
-              </a:ext>
-            </a:extLst>
-          </p:cNvPr>
-          <p:cNvSpPr>
-            <a:spLocks noGrp="1"/>
-          </p:cNvSpPr>
-          <p:nvPr>
-            <p:ph type="title"/>
-          </p:nvPr>
-        </p:nvSpPr>
-        <p:spPr/>
-        <p:txBody>
-          <a:bodyPr/>
-          <a:lstStyle/>
-          <a:p>
-            <a:r>
-              <a:rPr lang="en-US" dirty="0"/>
-              <a:t>models</a:t>
-            </a:r>
-          </a:p>
-        </p:txBody>
-      </p:sp>
-      <p:sp>
-        <p:nvSpPr>
-          <p:cNvPr id="3" name="Content Placeholder 2">
-            <a:extLst>
-              <a:ext uri="{FF2B5EF4-FFF2-40B4-BE49-F238E27FC236}">
-                <a16:creationId xmlns:a16="http://schemas.microsoft.com/office/drawing/2014/main" id="{4E989DE7-DFB2-374A-B8DC-20E5744F94FB}"/>
-              </a:ext>
-            </a:extLst>
-          </p:cNvPr>
-          <p:cNvSpPr>
-            <a:spLocks noGrp="1"/>
-          </p:cNvSpPr>
-          <p:nvPr>
-            <p:ph idx="1"/>
-          </p:nvPr>
-        </p:nvSpPr>
-        <p:spPr/>
-        <p:txBody>
-          <a:bodyPr>
-            <a:normAutofit lnSpcReduction="10000"/>
-          </a:bodyPr>
-          <a:lstStyle/>
-          <a:p>
-            <a:r>
-              <a:rPr lang="en-US" b="1" dirty="0"/>
-              <a:t>Content Based Recommended Systems (using Matrices)</a:t>
-            </a:r>
-          </a:p>
-          <a:p>
-            <a:pPr lvl="1"/>
-            <a:r>
-              <a:rPr lang="en-US" dirty="0"/>
-              <a:t>Predicting an average rating of 3.5 </a:t>
-            </a:r>
-          </a:p>
-          <a:p>
-            <a:pPr lvl="1"/>
-            <a:r>
-              <a:rPr lang="en-US" dirty="0"/>
-              <a:t>Predicting based on user's average of all books</a:t>
-            </a:r>
-          </a:p>
-          <a:p>
-            <a:pPr lvl="1"/>
-            <a:r>
-              <a:rPr lang="en-US" dirty="0"/>
-              <a:t>Predicting a users 'ratings for a given book based on the average rating all books</a:t>
-            </a:r>
-          </a:p>
-          <a:p>
-            <a:r>
-              <a:rPr lang="en-US" b="1" dirty="0"/>
-              <a:t>Latent Factor Based or Matrix Factorization (Embedding Model using </a:t>
-            </a:r>
-            <a:r>
-              <a:rPr lang="en-US" b="1" dirty="0" err="1"/>
-              <a:t>Keras</a:t>
-            </a:r>
-            <a:r>
-              <a:rPr lang="en-US" b="1" dirty="0"/>
-              <a:t>)</a:t>
-            </a:r>
-          </a:p>
-          <a:p>
-            <a:pPr lvl="1"/>
-            <a:r>
-              <a:rPr lang="en-US" dirty="0"/>
-              <a:t>Input for both books and users</a:t>
-            </a:r>
-          </a:p>
-          <a:p>
-            <a:pPr lvl="1"/>
-            <a:r>
-              <a:rPr lang="en-US" dirty="0"/>
-              <a:t>Embeddings for books and users</a:t>
-            </a:r>
-          </a:p>
-          <a:p>
-            <a:pPr lvl="1"/>
-            <a:r>
-              <a:rPr lang="en-US" dirty="0"/>
-              <a:t>Combines embeddings using a dot product</a:t>
-            </a:r>
-          </a:p>
-          <a:p>
-            <a:pPr lvl="1"/>
-            <a:endParaRPr lang="en-US" b="1" dirty="0"/>
-          </a:p>
-          <a:p>
-            <a:endParaRPr lang="en-US" dirty="0"/>
-          </a:p>
-        </p:txBody>
-      </p:sp>
-    </p:spTree>
-    <p:extLst>
-      <p:ext uri="{BB962C8B-B14F-4D97-AF65-F5344CB8AC3E}">
-        <p14:creationId xmlns:p14="http://schemas.microsoft.com/office/powerpoint/2010/main" val="2707971681"/>
-      </p:ext>
-    </p:extLst>
-  </p:cSld>
-  <p:clrMapOvr>
-    <a:masterClrMapping/>
-  </p:clrMapOvr>
-</p:sld>
-</file>
-
 <file path=ppt/theme/theme1.xml><?xml version="1.0" encoding="utf-8"?>
 <a:theme xmlns:a="http://schemas.openxmlformats.org/drawingml/2006/main" name="Parcel">
   <a:themeElements>

</xml_diff>